<commit_message>
Anforderungen und pdf hinzugefügt
</commit_message>
<xml_diff>
--- a/projektinformationen/Abschlusspräsentation/Abschlusspräsentation.pptx
+++ b/projektinformationen/Abschlusspräsentation/Abschlusspräsentation.pptx
@@ -5,27 +5,28 @@
     <p:sldMasterId id="2147483648" r:id="rId1"/>
   </p:sldMasterIdLst>
   <p:notesMasterIdLst>
-    <p:notesMasterId r:id="rId20"/>
+    <p:notesMasterId r:id="rId21"/>
   </p:notesMasterIdLst>
   <p:sldIdLst>
     <p:sldId id="257" r:id="rId2"/>
     <p:sldId id="258" r:id="rId3"/>
-    <p:sldId id="259" r:id="rId4"/>
-    <p:sldId id="260" r:id="rId5"/>
-    <p:sldId id="264" r:id="rId6"/>
-    <p:sldId id="261" r:id="rId7"/>
-    <p:sldId id="262" r:id="rId8"/>
-    <p:sldId id="263" r:id="rId9"/>
-    <p:sldId id="265" r:id="rId10"/>
-    <p:sldId id="267" r:id="rId11"/>
-    <p:sldId id="270" r:id="rId12"/>
-    <p:sldId id="268" r:id="rId13"/>
-    <p:sldId id="271" r:id="rId14"/>
-    <p:sldId id="272" r:id="rId15"/>
-    <p:sldId id="273" r:id="rId16"/>
-    <p:sldId id="266" r:id="rId17"/>
-    <p:sldId id="274" r:id="rId18"/>
-    <p:sldId id="269" r:id="rId19"/>
+    <p:sldId id="275" r:id="rId4"/>
+    <p:sldId id="259" r:id="rId5"/>
+    <p:sldId id="260" r:id="rId6"/>
+    <p:sldId id="264" r:id="rId7"/>
+    <p:sldId id="261" r:id="rId8"/>
+    <p:sldId id="262" r:id="rId9"/>
+    <p:sldId id="263" r:id="rId10"/>
+    <p:sldId id="265" r:id="rId11"/>
+    <p:sldId id="267" r:id="rId12"/>
+    <p:sldId id="270" r:id="rId13"/>
+    <p:sldId id="268" r:id="rId14"/>
+    <p:sldId id="271" r:id="rId15"/>
+    <p:sldId id="272" r:id="rId16"/>
+    <p:sldId id="273" r:id="rId17"/>
+    <p:sldId id="266" r:id="rId18"/>
+    <p:sldId id="274" r:id="rId19"/>
+    <p:sldId id="269" r:id="rId20"/>
   </p:sldIdLst>
   <p:sldSz cx="9144000" cy="6858000" type="screen4x3"/>
   <p:notesSz cx="6858000" cy="9144000"/>
@@ -416,7 +417,7 @@
     </p:spTree>
     <p:extLst>
       <p:ext uri="{BB962C8B-B14F-4D97-AF65-F5344CB8AC3E}">
-        <p14:creationId xmlns:p14="http://schemas.microsoft.com/office/powerpoint/2010/main" val="2205661716"/>
+        <p14:creationId xmlns:p14="http://schemas.microsoft.com/office/powerpoint/2010/main" val="246606785"/>
       </p:ext>
     </p:extLst>
   </p:cSld>
@@ -481,7 +482,7 @@
     </p:spTree>
     <p:extLst>
       <p:ext uri="{BB962C8B-B14F-4D97-AF65-F5344CB8AC3E}">
-        <p14:creationId xmlns:p14="http://schemas.microsoft.com/office/powerpoint/2010/main" val="3702581603"/>
+        <p14:creationId xmlns:p14="http://schemas.microsoft.com/office/powerpoint/2010/main" val="2205661716"/>
       </p:ext>
     </p:extLst>
   </p:cSld>
@@ -546,7 +547,7 @@
     </p:spTree>
     <p:extLst>
       <p:ext uri="{BB962C8B-B14F-4D97-AF65-F5344CB8AC3E}">
-        <p14:creationId xmlns:p14="http://schemas.microsoft.com/office/powerpoint/2010/main" val="1627862435"/>
+        <p14:creationId xmlns:p14="http://schemas.microsoft.com/office/powerpoint/2010/main" val="3702581603"/>
       </p:ext>
     </p:extLst>
   </p:cSld>
@@ -602,7 +603,7 @@
           <a:p>
             <a:r>
               <a:rPr lang="de-DE" dirty="0" smtClean="0"/>
-              <a:t>Lars</a:t>
+              <a:t>Andy</a:t>
             </a:r>
             <a:endParaRPr lang="de-DE" dirty="0"/>
           </a:p>
@@ -611,7 +612,7 @@
     </p:spTree>
     <p:extLst>
       <p:ext uri="{BB962C8B-B14F-4D97-AF65-F5344CB8AC3E}">
-        <p14:creationId xmlns:p14="http://schemas.microsoft.com/office/powerpoint/2010/main" val="3433903095"/>
+        <p14:creationId xmlns:p14="http://schemas.microsoft.com/office/powerpoint/2010/main" val="1627862435"/>
       </p:ext>
     </p:extLst>
   </p:cSld>
@@ -676,7 +677,7 @@
     </p:spTree>
     <p:extLst>
       <p:ext uri="{BB962C8B-B14F-4D97-AF65-F5344CB8AC3E}">
-        <p14:creationId xmlns:p14="http://schemas.microsoft.com/office/powerpoint/2010/main" val="468220005"/>
+        <p14:creationId xmlns:p14="http://schemas.microsoft.com/office/powerpoint/2010/main" val="3433903095"/>
       </p:ext>
     </p:extLst>
   </p:cSld>
@@ -741,7 +742,7 @@
     </p:spTree>
     <p:extLst>
       <p:ext uri="{BB962C8B-B14F-4D97-AF65-F5344CB8AC3E}">
-        <p14:creationId xmlns:p14="http://schemas.microsoft.com/office/powerpoint/2010/main" val="1102569668"/>
+        <p14:creationId xmlns:p14="http://schemas.microsoft.com/office/powerpoint/2010/main" val="468220005"/>
       </p:ext>
     </p:extLst>
   </p:cSld>
@@ -797,7 +798,7 @@
           <a:p>
             <a:r>
               <a:rPr lang="de-DE" dirty="0" smtClean="0"/>
-              <a:t>Andy</a:t>
+              <a:t>Lars</a:t>
             </a:r>
             <a:endParaRPr lang="de-DE" dirty="0"/>
           </a:p>
@@ -806,7 +807,7 @@
     </p:spTree>
     <p:extLst>
       <p:ext uri="{BB962C8B-B14F-4D97-AF65-F5344CB8AC3E}">
-        <p14:creationId xmlns:p14="http://schemas.microsoft.com/office/powerpoint/2010/main" val="2470141095"/>
+        <p14:creationId xmlns:p14="http://schemas.microsoft.com/office/powerpoint/2010/main" val="1102569668"/>
       </p:ext>
     </p:extLst>
   </p:cSld>
@@ -862,6 +863,71 @@
           <a:p>
             <a:r>
               <a:rPr lang="de-DE" dirty="0" smtClean="0"/>
+              <a:t>Andy</a:t>
+            </a:r>
+            <a:endParaRPr lang="de-DE" dirty="0"/>
+          </a:p>
+        </p:txBody>
+      </p:sp>
+    </p:spTree>
+    <p:extLst>
+      <p:ext uri="{BB962C8B-B14F-4D97-AF65-F5344CB8AC3E}">
+        <p14:creationId xmlns:p14="http://schemas.microsoft.com/office/powerpoint/2010/main" val="2470141095"/>
+      </p:ext>
+    </p:extLst>
+  </p:cSld>
+  <p:clrMapOvr>
+    <a:masterClrMapping/>
+  </p:clrMapOvr>
+</p:notes>
+</file>
+
+<file path=ppt/notesSlides/notesSlide18.xml><?xml version="1.0" encoding="utf-8"?>
+<p:notes xmlns:a="http://schemas.openxmlformats.org/drawingml/2006/main" xmlns:r="http://schemas.openxmlformats.org/officeDocument/2006/relationships" xmlns:p="http://schemas.openxmlformats.org/presentationml/2006/main">
+  <p:cSld>
+    <p:spTree>
+      <p:nvGrpSpPr>
+        <p:cNvPr id="1" name=""/>
+        <p:cNvGrpSpPr/>
+        <p:nvPr/>
+      </p:nvGrpSpPr>
+      <p:grpSpPr>
+        <a:xfrm>
+          <a:off x="0" y="0"/>
+          <a:ext cx="0" cy="0"/>
+          <a:chOff x="0" y="0"/>
+          <a:chExt cx="0" cy="0"/>
+        </a:xfrm>
+      </p:grpSpPr>
+      <p:sp>
+        <p:nvSpPr>
+          <p:cNvPr id="2" name="Folienbildplatzhalter 1"/>
+          <p:cNvSpPr>
+            <a:spLocks noGrp="1" noRot="1" noChangeAspect="1"/>
+          </p:cNvSpPr>
+          <p:nvPr>
+            <p:ph type="sldImg"/>
+          </p:nvPr>
+        </p:nvSpPr>
+        <p:spPr/>
+      </p:sp>
+      <p:sp>
+        <p:nvSpPr>
+          <p:cNvPr id="3" name="Notizenplatzhalter 2"/>
+          <p:cNvSpPr>
+            <a:spLocks noGrp="1"/>
+          </p:cNvSpPr>
+          <p:nvPr>
+            <p:ph type="body" idx="1"/>
+          </p:nvPr>
+        </p:nvSpPr>
+        <p:spPr/>
+        <p:txBody>
+          <a:bodyPr/>
+          <a:lstStyle/>
+          <a:p>
+            <a:r>
+              <a:rPr lang="de-DE" dirty="0" smtClean="0"/>
               <a:t>Stephan</a:t>
             </a:r>
             <a:endParaRPr lang="de-DE" dirty="0"/>
@@ -881,7 +947,7 @@
 </p:notes>
 </file>
 
-<file path=ppt/notesSlides/notesSlide18.xml><?xml version="1.0" encoding="utf-8"?>
+<file path=ppt/notesSlides/notesSlide19.xml><?xml version="1.0" encoding="utf-8"?>
 <p:notes xmlns:a="http://schemas.openxmlformats.org/drawingml/2006/main" xmlns:r="http://schemas.openxmlformats.org/officeDocument/2006/relationships" xmlns:p="http://schemas.openxmlformats.org/presentationml/2006/main">
   <p:cSld>
     <p:spTree>
@@ -1066,7 +1132,7 @@
     </p:spTree>
     <p:extLst>
       <p:ext uri="{BB962C8B-B14F-4D97-AF65-F5344CB8AC3E}">
-        <p14:creationId xmlns:p14="http://schemas.microsoft.com/office/powerpoint/2010/main" val="377474801"/>
+        <p14:creationId xmlns:p14="http://schemas.microsoft.com/office/powerpoint/2010/main" val="216670089"/>
       </p:ext>
     </p:extLst>
   </p:cSld>
@@ -1131,7 +1197,7 @@
     </p:spTree>
     <p:extLst>
       <p:ext uri="{BB962C8B-B14F-4D97-AF65-F5344CB8AC3E}">
-        <p14:creationId xmlns:p14="http://schemas.microsoft.com/office/powerpoint/2010/main" val="1275043547"/>
+        <p14:creationId xmlns:p14="http://schemas.microsoft.com/office/powerpoint/2010/main" val="377474801"/>
       </p:ext>
     </p:extLst>
   </p:cSld>
@@ -1187,29 +1253,7 @@
           <a:p>
             <a:r>
               <a:rPr lang="de-DE" dirty="0" smtClean="0"/>
-              <a:t>Stephan</a:t>
-            </a:r>
-          </a:p>
-          <a:p>
-            <a:r>
-              <a:rPr lang="de-DE" dirty="0" smtClean="0"/>
-              <a:t>[]-&gt;unbekannter</a:t>
-            </a:r>
-            <a:r>
-              <a:rPr lang="de-DE" baseline="0" dirty="0" smtClean="0"/>
-              <a:t> Knoten, ähnlich zu offener Liste (Container)</a:t>
-            </a:r>
-          </a:p>
-          <a:p>
-            <a:r>
-              <a:rPr lang="de-DE" baseline="0" dirty="0" smtClean="0"/>
-              <a:t>()-&gt;geschlossene Liste (Collection)</a:t>
-            </a:r>
-          </a:p>
-          <a:p>
-            <a:r>
-              <a:rPr lang="de-DE" baseline="0" dirty="0" smtClean="0"/>
-              <a:t>Was bedeutet geschlossen?</a:t>
+              <a:t>Lars</a:t>
             </a:r>
             <a:endParaRPr lang="de-DE" dirty="0"/>
           </a:p>
@@ -1218,7 +1262,7 @@
     </p:spTree>
     <p:extLst>
       <p:ext uri="{BB962C8B-B14F-4D97-AF65-F5344CB8AC3E}">
-        <p14:creationId xmlns:p14="http://schemas.microsoft.com/office/powerpoint/2010/main" val="986438545"/>
+        <p14:creationId xmlns:p14="http://schemas.microsoft.com/office/powerpoint/2010/main" val="1275043547"/>
       </p:ext>
     </p:extLst>
   </p:cSld>
@@ -1276,6 +1320,28 @@
               <a:rPr lang="de-DE" dirty="0" smtClean="0"/>
               <a:t>Stephan</a:t>
             </a:r>
+          </a:p>
+          <a:p>
+            <a:r>
+              <a:rPr lang="de-DE" dirty="0" smtClean="0"/>
+              <a:t>[]-&gt;unbekannter</a:t>
+            </a:r>
+            <a:r>
+              <a:rPr lang="de-DE" baseline="0" dirty="0" smtClean="0"/>
+              <a:t> Knoten, ähnlich zu offener Liste (Container)</a:t>
+            </a:r>
+          </a:p>
+          <a:p>
+            <a:r>
+              <a:rPr lang="de-DE" baseline="0" dirty="0" smtClean="0"/>
+              <a:t>()-&gt;geschlossene Liste (Collection)</a:t>
+            </a:r>
+          </a:p>
+          <a:p>
+            <a:r>
+              <a:rPr lang="de-DE" baseline="0" dirty="0" smtClean="0"/>
+              <a:t>Was bedeutet geschlossen?</a:t>
+            </a:r>
             <a:endParaRPr lang="de-DE" dirty="0"/>
           </a:p>
         </p:txBody>
@@ -1283,7 +1349,7 @@
     </p:spTree>
     <p:extLst>
       <p:ext uri="{BB962C8B-B14F-4D97-AF65-F5344CB8AC3E}">
-        <p14:creationId xmlns:p14="http://schemas.microsoft.com/office/powerpoint/2010/main" val="647056791"/>
+        <p14:creationId xmlns:p14="http://schemas.microsoft.com/office/powerpoint/2010/main" val="986438545"/>
       </p:ext>
     </p:extLst>
   </p:cSld>
@@ -1348,7 +1414,7 @@
     </p:spTree>
     <p:extLst>
       <p:ext uri="{BB962C8B-B14F-4D97-AF65-F5344CB8AC3E}">
-        <p14:creationId xmlns:p14="http://schemas.microsoft.com/office/powerpoint/2010/main" val="3700844430"/>
+        <p14:creationId xmlns:p14="http://schemas.microsoft.com/office/powerpoint/2010/main" val="647056791"/>
       </p:ext>
     </p:extLst>
   </p:cSld>
@@ -1413,7 +1479,7 @@
     </p:spTree>
     <p:extLst>
       <p:ext uri="{BB962C8B-B14F-4D97-AF65-F5344CB8AC3E}">
-        <p14:creationId xmlns:p14="http://schemas.microsoft.com/office/powerpoint/2010/main" val="844507306"/>
+        <p14:creationId xmlns:p14="http://schemas.microsoft.com/office/powerpoint/2010/main" val="3700844430"/>
       </p:ext>
     </p:extLst>
   </p:cSld>
@@ -1469,7 +1535,7 @@
           <a:p>
             <a:r>
               <a:rPr lang="de-DE" dirty="0" smtClean="0"/>
-              <a:t>Andy</a:t>
+              <a:t>Stephan</a:t>
             </a:r>
             <a:endParaRPr lang="de-DE" dirty="0"/>
           </a:p>
@@ -1478,7 +1544,7 @@
     </p:spTree>
     <p:extLst>
       <p:ext uri="{BB962C8B-B14F-4D97-AF65-F5344CB8AC3E}">
-        <p14:creationId xmlns:p14="http://schemas.microsoft.com/office/powerpoint/2010/main" val="246606785"/>
+        <p14:creationId xmlns:p14="http://schemas.microsoft.com/office/powerpoint/2010/main" val="844507306"/>
       </p:ext>
     </p:extLst>
   </p:cSld>
@@ -1718,7 +1784,7 @@
           </a:ln>
           <a:extLst>
             <a:ext uri="{C572A759-6A51-4108-AA02-DFA0A04FC94B}">
-              <ma14:wrappingTextBoxFlag xmlns:ma14="http://schemas.microsoft.com/office/mac/drawingml/2011/main" xmlns="" val="1"/>
+              <ma14:wrappingTextBoxFlag xmlns="" xmlns:ma14="http://schemas.microsoft.com/office/mac/drawingml/2011/main" val="1"/>
             </a:ext>
           </a:extLst>
         </p:spPr>
@@ -1799,7 +1865,7 @@
           </a:ln>
           <a:extLst>
             <a:ext uri="{C572A759-6A51-4108-AA02-DFA0A04FC94B}">
-              <ma14:wrappingTextBoxFlag xmlns:ma14="http://schemas.microsoft.com/office/mac/drawingml/2011/main" xmlns="" val="1"/>
+              <ma14:wrappingTextBoxFlag xmlns="" xmlns:ma14="http://schemas.microsoft.com/office/mac/drawingml/2011/main" val="1"/>
             </a:ext>
           </a:extLst>
         </p:spPr>
@@ -1936,7 +2002,7 @@
           </a:ln>
           <a:extLst>
             <a:ext uri="{C572A759-6A51-4108-AA02-DFA0A04FC94B}">
-              <ma14:wrappingTextBoxFlag xmlns:ma14="http://schemas.microsoft.com/office/mac/drawingml/2011/main" xmlns="" val="1"/>
+              <ma14:wrappingTextBoxFlag xmlns="" xmlns:ma14="http://schemas.microsoft.com/office/mac/drawingml/2011/main" val="1"/>
             </a:ext>
           </a:extLst>
         </p:spPr>
@@ -2018,7 +2084,7 @@
           </a:ln>
           <a:extLst>
             <a:ext uri="{C572A759-6A51-4108-AA02-DFA0A04FC94B}">
-              <ma14:wrappingTextBoxFlag xmlns:ma14="http://schemas.microsoft.com/office/mac/drawingml/2011/main" xmlns="" val="1"/>
+              <ma14:wrappingTextBoxFlag xmlns="" xmlns:ma14="http://schemas.microsoft.com/office/mac/drawingml/2011/main" val="1"/>
             </a:ext>
           </a:extLst>
         </p:spPr>
@@ -2154,7 +2220,7 @@
           </a:ln>
           <a:extLst>
             <a:ext uri="{C572A759-6A51-4108-AA02-DFA0A04FC94B}">
-              <ma14:wrappingTextBoxFlag xmlns:ma14="http://schemas.microsoft.com/office/mac/drawingml/2011/main" xmlns="" val="1"/>
+              <ma14:wrappingTextBoxFlag xmlns="" xmlns:ma14="http://schemas.microsoft.com/office/mac/drawingml/2011/main" val="1"/>
             </a:ext>
           </a:extLst>
         </p:spPr>
@@ -2240,7 +2306,7 @@
           </a:ln>
           <a:extLst>
             <a:ext uri="{C572A759-6A51-4108-AA02-DFA0A04FC94B}">
-              <ma14:wrappingTextBoxFlag xmlns:ma14="http://schemas.microsoft.com/office/mac/drawingml/2011/main" xmlns="" val="1"/>
+              <ma14:wrappingTextBoxFlag xmlns="" xmlns:ma14="http://schemas.microsoft.com/office/mac/drawingml/2011/main" val="1"/>
             </a:ext>
           </a:extLst>
         </p:spPr>
@@ -2281,7 +2347,7 @@
           </a:ln>
           <a:extLst>
             <a:ext uri="{C572A759-6A51-4108-AA02-DFA0A04FC94B}">
-              <ma14:wrappingTextBoxFlag xmlns:ma14="http://schemas.microsoft.com/office/mac/drawingml/2011/main" xmlns="" val="1"/>
+              <ma14:wrappingTextBoxFlag xmlns="" xmlns:ma14="http://schemas.microsoft.com/office/mac/drawingml/2011/main" val="1"/>
             </a:ext>
           </a:extLst>
         </p:spPr>
@@ -2434,7 +2500,7 @@
           </a:ln>
           <a:extLst>
             <a:ext uri="{C572A759-6A51-4108-AA02-DFA0A04FC94B}">
-              <ma14:wrappingTextBoxFlag xmlns:ma14="http://schemas.microsoft.com/office/mac/drawingml/2011/main" xmlns="" val="1"/>
+              <ma14:wrappingTextBoxFlag xmlns="" xmlns:ma14="http://schemas.microsoft.com/office/mac/drawingml/2011/main" val="1"/>
             </a:ext>
           </a:extLst>
         </p:spPr>
@@ -2874,7 +2940,7 @@
           </a:ln>
           <a:extLst>
             <a:ext uri="{C572A759-6A51-4108-AA02-DFA0A04FC94B}">
-              <ma14:wrappingTextBoxFlag xmlns:ma14="http://schemas.microsoft.com/office/mac/drawingml/2011/main" xmlns="" val="1"/>
+              <ma14:wrappingTextBoxFlag xmlns="" xmlns:ma14="http://schemas.microsoft.com/office/mac/drawingml/2011/main" val="1"/>
             </a:ext>
           </a:extLst>
         </p:spPr>
@@ -3026,6 +3092,189 @@
 </file>
 
 <file path=ppt/slides/slide10.xml><?xml version="1.0" encoding="utf-8"?>
+<p:sld xmlns:a="http://schemas.openxmlformats.org/drawingml/2006/main" xmlns:r="http://schemas.openxmlformats.org/officeDocument/2006/relationships" xmlns:p="http://schemas.openxmlformats.org/presentationml/2006/main">
+  <p:cSld>
+    <p:spTree>
+      <p:nvGrpSpPr>
+        <p:cNvPr id="1" name=""/>
+        <p:cNvGrpSpPr/>
+        <p:nvPr/>
+      </p:nvGrpSpPr>
+      <p:grpSpPr>
+        <a:xfrm>
+          <a:off x="0" y="0"/>
+          <a:ext cx="0" cy="0"/>
+          <a:chOff x="0" y="0"/>
+          <a:chExt cx="0" cy="0"/>
+        </a:xfrm>
+      </p:grpSpPr>
+      <p:sp>
+        <p:nvSpPr>
+          <p:cNvPr id="2" name="Titel 1"/>
+          <p:cNvSpPr>
+            <a:spLocks noGrp="1"/>
+          </p:cNvSpPr>
+          <p:nvPr>
+            <p:ph type="title"/>
+          </p:nvPr>
+        </p:nvSpPr>
+        <p:spPr/>
+        <p:txBody>
+          <a:bodyPr/>
+          <a:lstStyle/>
+          <a:p>
+            <a:r>
+              <a:rPr lang="de-DE" dirty="0" smtClean="0"/>
+              <a:t>Funktionalitäten</a:t>
+            </a:r>
+            <a:endParaRPr lang="de-DE" dirty="0"/>
+          </a:p>
+        </p:txBody>
+      </p:sp>
+      <p:sp>
+        <p:nvSpPr>
+          <p:cNvPr id="3" name="Textplatzhalter 2"/>
+          <p:cNvSpPr>
+            <a:spLocks noGrp="1"/>
+          </p:cNvSpPr>
+          <p:nvPr>
+            <p:ph type="body" idx="1"/>
+          </p:nvPr>
+        </p:nvSpPr>
+        <p:spPr>
+          <a:xfrm>
+            <a:off x="539552" y="1268761"/>
+            <a:ext cx="8153400" cy="4968552"/>
+          </a:xfrm>
+        </p:spPr>
+        <p:txBody>
+          <a:bodyPr/>
+          <a:lstStyle/>
+          <a:p>
+            <a:pPr marL="342900" indent="-342900">
+              <a:buFont typeface="Arial" panose="020B0604020202020204" pitchFamily="34" charset="0"/>
+              <a:buChar char="•"/>
+            </a:pPr>
+            <a:r>
+              <a:rPr lang="de-DE" dirty="0" smtClean="0"/>
+              <a:t>Modell ausgeben (Turtle, XML, N-Triple, N3, JSON, RDF JSON)</a:t>
+            </a:r>
+          </a:p>
+          <a:p>
+            <a:pPr marL="342900" indent="-342900">
+              <a:buFont typeface="Arial" panose="020B0604020202020204" pitchFamily="34" charset="0"/>
+              <a:buChar char="•"/>
+            </a:pPr>
+            <a:r>
+              <a:rPr lang="de-DE" dirty="0" smtClean="0"/>
+              <a:t>Grundlegende Ausgaben:</a:t>
+            </a:r>
+          </a:p>
+          <a:p>
+            <a:pPr marL="820897" lvl="1" indent="-342900">
+              <a:buFont typeface="Arial" panose="020B0604020202020204" pitchFamily="34" charset="0"/>
+              <a:buChar char="•"/>
+            </a:pPr>
+            <a:r>
+              <a:rPr lang="de-DE" dirty="0" smtClean="0"/>
+              <a:t>Kategorien, Algorithmen, Eigenschaften, Clustertypen</a:t>
+            </a:r>
+          </a:p>
+          <a:p>
+            <a:pPr marL="342900" indent="-342900">
+              <a:buFont typeface="Arial" panose="020B0604020202020204" pitchFamily="34" charset="0"/>
+              <a:buChar char="•"/>
+            </a:pPr>
+            <a:r>
+              <a:rPr lang="de-DE" dirty="0" smtClean="0"/>
+              <a:t>A: Scenario: Auswahl von einem oder mehreren Clustertypen -&gt; Ausgabe aller passenden Algorithmen</a:t>
+            </a:r>
+          </a:p>
+          <a:p>
+            <a:pPr marL="342900" indent="-342900">
+              <a:buFont typeface="Arial" panose="020B0604020202020204" pitchFamily="34" charset="0"/>
+              <a:buChar char="•"/>
+            </a:pPr>
+            <a:r>
+              <a:rPr lang="de-DE" dirty="0" smtClean="0"/>
+              <a:t>B: </a:t>
+            </a:r>
+            <a:r>
+              <a:rPr lang="de-DE" dirty="0" err="1" smtClean="0"/>
+              <a:t>Browsing</a:t>
+            </a:r>
+            <a:r>
+              <a:rPr lang="de-DE" dirty="0" smtClean="0"/>
+              <a:t>: Auswahl einer Kategorie</a:t>
+            </a:r>
+            <a:br>
+              <a:rPr lang="de-DE" dirty="0" smtClean="0"/>
+            </a:br>
+            <a:r>
+              <a:rPr lang="de-DE" dirty="0" smtClean="0"/>
+              <a:t>-&gt; Ausgabe aller passenden Algorithmen</a:t>
+            </a:r>
+          </a:p>
+          <a:p>
+            <a:pPr marL="342900" indent="-342900">
+              <a:buFont typeface="Arial" panose="020B0604020202020204" pitchFamily="34" charset="0"/>
+              <a:buChar char="•"/>
+            </a:pPr>
+            <a:r>
+              <a:rPr lang="de-DE" dirty="0" smtClean="0"/>
+              <a:t>C: Eigenschaften: Auswahl mehrerer Eigenschaften und deren Werte</a:t>
+            </a:r>
+          </a:p>
+          <a:p>
+            <a:pPr marL="477997" lvl="1" indent="0">
+              <a:buNone/>
+            </a:pPr>
+            <a:r>
+              <a:rPr lang="de-DE" dirty="0" smtClean="0"/>
+              <a:t>-&gt; Ausgabe aller passenden Algorithmen</a:t>
+            </a:r>
+          </a:p>
+          <a:p>
+            <a:pPr marL="342900" indent="-342900">
+              <a:buFont typeface="Arial" panose="020B0604020202020204" pitchFamily="34" charset="0"/>
+              <a:buChar char="•"/>
+            </a:pPr>
+            <a:r>
+              <a:rPr lang="de-DE" dirty="0" smtClean="0"/>
+              <a:t>D: Literatur: Auswahl von einem oder mehreren Algorithmen</a:t>
+            </a:r>
+            <a:br>
+              <a:rPr lang="de-DE" dirty="0" smtClean="0"/>
+            </a:br>
+            <a:r>
+              <a:rPr lang="de-DE" dirty="0" smtClean="0"/>
+              <a:t>-&gt; Ausgabe aller zugehörigen Paper</a:t>
+            </a:r>
+          </a:p>
+        </p:txBody>
+      </p:sp>
+    </p:spTree>
+    <p:extLst>
+      <p:ext uri="{BB962C8B-B14F-4D97-AF65-F5344CB8AC3E}">
+        <p14:creationId xmlns:p14="http://schemas.microsoft.com/office/powerpoint/2010/main" val="2063078888"/>
+      </p:ext>
+    </p:extLst>
+  </p:cSld>
+  <p:clrMapOvr>
+    <a:masterClrMapping/>
+  </p:clrMapOvr>
+  <p:transition spd="med"/>
+  <p:timing>
+    <p:tnLst>
+      <p:par>
+        <p:cTn id="1" dur="indefinite" restart="never" nodeType="tmRoot"/>
+      </p:par>
+    </p:tnLst>
+  </p:timing>
+</p:sld>
+</file>
+
+<file path=ppt/slides/slide11.xml><?xml version="1.0" encoding="utf-8"?>
 <p:sld xmlns:a="http://schemas.openxmlformats.org/drawingml/2006/main" xmlns:r="http://schemas.openxmlformats.org/officeDocument/2006/relationships" xmlns:p="http://schemas.openxmlformats.org/presentationml/2006/main">
   <p:cSld>
     <p:spTree>
@@ -3346,7 +3595,7 @@
 </p:sld>
 </file>
 
-<file path=ppt/slides/slide11.xml><?xml version="1.0" encoding="utf-8"?>
+<file path=ppt/slides/slide12.xml><?xml version="1.0" encoding="utf-8"?>
 <p:sld xmlns:a="http://schemas.openxmlformats.org/drawingml/2006/main" xmlns:r="http://schemas.openxmlformats.org/officeDocument/2006/relationships" xmlns:p="http://schemas.openxmlformats.org/presentationml/2006/main">
   <p:cSld>
     <p:spTree>
@@ -3667,7 +3916,7 @@
 </p:sld>
 </file>
 
-<file path=ppt/slides/slide12.xml><?xml version="1.0" encoding="utf-8"?>
+<file path=ppt/slides/slide13.xml><?xml version="1.0" encoding="utf-8"?>
 <p:sld xmlns:a="http://schemas.openxmlformats.org/drawingml/2006/main" xmlns:r="http://schemas.openxmlformats.org/officeDocument/2006/relationships" xmlns:p="http://schemas.openxmlformats.org/presentationml/2006/main">
   <p:cSld>
     <p:spTree>
@@ -3769,7 +4018,7 @@
 </p:sld>
 </file>
 
-<file path=ppt/slides/slide13.xml><?xml version="1.0" encoding="utf-8"?>
+<file path=ppt/slides/slide14.xml><?xml version="1.0" encoding="utf-8"?>
 <p:sld xmlns:a="http://schemas.openxmlformats.org/drawingml/2006/main" xmlns:r="http://schemas.openxmlformats.org/officeDocument/2006/relationships" xmlns:p="http://schemas.openxmlformats.org/presentationml/2006/main">
   <p:cSld>
     <p:spTree>
@@ -3871,7 +4120,7 @@
 </p:sld>
 </file>
 
-<file path=ppt/slides/slide14.xml><?xml version="1.0" encoding="utf-8"?>
+<file path=ppt/slides/slide15.xml><?xml version="1.0" encoding="utf-8"?>
 <p:sld xmlns:a="http://schemas.openxmlformats.org/drawingml/2006/main" xmlns:r="http://schemas.openxmlformats.org/officeDocument/2006/relationships" xmlns:p="http://schemas.openxmlformats.org/presentationml/2006/main">
   <p:cSld>
     <p:spTree>
@@ -3977,7 +4226,7 @@
 </p:sld>
 </file>
 
-<file path=ppt/slides/slide15.xml><?xml version="1.0" encoding="utf-8"?>
+<file path=ppt/slides/slide16.xml><?xml version="1.0" encoding="utf-8"?>
 <p:sld xmlns:a="http://schemas.openxmlformats.org/drawingml/2006/main" xmlns:r="http://schemas.openxmlformats.org/officeDocument/2006/relationships" xmlns:p="http://schemas.openxmlformats.org/presentationml/2006/main">
   <p:cSld>
     <p:spTree>
@@ -4079,7 +4328,7 @@
 </p:sld>
 </file>
 
-<file path=ppt/slides/slide16.xml><?xml version="1.0" encoding="utf-8"?>
+<file path=ppt/slides/slide17.xml><?xml version="1.0" encoding="utf-8"?>
 <p:sld xmlns:a="http://schemas.openxmlformats.org/drawingml/2006/main" xmlns:r="http://schemas.openxmlformats.org/officeDocument/2006/relationships" xmlns:p="http://schemas.openxmlformats.org/presentationml/2006/main">
   <p:cSld>
     <p:spTree>
@@ -4214,7 +4463,7 @@
 </p:sld>
 </file>
 
-<file path=ppt/slides/slide17.xml><?xml version="1.0" encoding="utf-8"?>
+<file path=ppt/slides/slide18.xml><?xml version="1.0" encoding="utf-8"?>
 <p:sld xmlns:a="http://schemas.openxmlformats.org/drawingml/2006/main" xmlns:r="http://schemas.openxmlformats.org/officeDocument/2006/relationships" xmlns:p="http://schemas.openxmlformats.org/presentationml/2006/main">
   <p:cSld>
     <p:spTree>
@@ -4378,7 +4627,6 @@
               <a:rPr lang="de-DE" dirty="0" smtClean="0"/>
               <a:t>Abfragen auslagern -&gt; Programm das sich ein Turtle-File und zugehörige Abfragen lädt</a:t>
             </a:r>
-            <a:endParaRPr lang="de-DE" dirty="0" smtClean="0"/>
           </a:p>
           <a:p>
             <a:pPr marL="342900" indent="-342900">
@@ -4410,7 +4658,7 @@
 </p:sld>
 </file>
 
-<file path=ppt/slides/slide18.xml><?xml version="1.0" encoding="utf-8"?>
+<file path=ppt/slides/slide19.xml><?xml version="1.0" encoding="utf-8"?>
 <p:sld xmlns:a="http://schemas.openxmlformats.org/drawingml/2006/main" xmlns:r="http://schemas.openxmlformats.org/officeDocument/2006/relationships" xmlns:p="http://schemas.openxmlformats.org/presentationml/2006/main">
   <p:cSld>
     <p:spTree>
@@ -4543,8 +4791,19 @@
             </a:pPr>
             <a:r>
               <a:rPr lang="de-DE" sz="2400" dirty="0" smtClean="0"/>
-              <a:t>Aufgabenverteilung</a:t>
-            </a:r>
+              <a:t>Anforderungen</a:t>
+            </a:r>
+          </a:p>
+          <a:p>
+            <a:pPr marL="457200" indent="-457200">
+              <a:buFont typeface="Arial" panose="020B0604020202020204" pitchFamily="34" charset="0"/>
+              <a:buChar char="•"/>
+            </a:pPr>
+            <a:r>
+              <a:rPr lang="de-DE" sz="2400" dirty="0" smtClean="0"/>
+              <a:t>Aufgabenverteilung / Workflow</a:t>
+            </a:r>
+            <a:endParaRPr lang="de-DE" sz="2400" dirty="0" smtClean="0"/>
           </a:p>
           <a:p>
             <a:pPr marL="457200" indent="-457200">
@@ -4689,7 +4948,7 @@
           <a:p>
             <a:r>
               <a:rPr lang="de-DE" dirty="0" smtClean="0"/>
-              <a:t>Aufgabenverteilung</a:t>
+              <a:t>Anforderungen</a:t>
             </a:r>
             <a:endParaRPr lang="de-DE" dirty="0"/>
           </a:p>
@@ -4716,14 +4975,188 @@
           <a:lstStyle/>
           <a:p>
             <a:pPr marL="457200" indent="-457200">
-              <a:buFont typeface="+mj-lt"/>
-              <a:buAutoNum type="arabicPeriod"/>
+              <a:buFont typeface="Arial" panose="020B0604020202020204" pitchFamily="34" charset="0"/>
+              <a:buChar char="•"/>
             </a:pPr>
             <a:r>
-              <a:rPr lang="de-DE" sz="2400" dirty="0" smtClean="0"/>
-              <a:t>Architektur &amp; Implementierung Java-Programm (Lars)</a:t>
-            </a:r>
-          </a:p>
+              <a:rPr lang="de-DE" sz="2000" dirty="0" smtClean="0"/>
+              <a:t>Java-Konsolenprogramm zur Verarbeitung eines RDF-Turtle-Files und </a:t>
+            </a:r>
+            <a:r>
+              <a:rPr lang="de-DE" sz="2000" dirty="0" err="1" smtClean="0"/>
+              <a:t>Sparql</a:t>
+            </a:r>
+            <a:r>
+              <a:rPr lang="de-DE" sz="2000" dirty="0" smtClean="0"/>
+              <a:t>-Abfragen</a:t>
+            </a:r>
+          </a:p>
+          <a:p>
+            <a:pPr marL="457200" indent="-457200">
+              <a:buFont typeface="Arial" panose="020B0604020202020204" pitchFamily="34" charset="0"/>
+              <a:buChar char="•"/>
+            </a:pPr>
+            <a:r>
+              <a:rPr lang="de-DE" sz="2000" dirty="0" smtClean="0"/>
+              <a:t>Erstellung eines RDF-Turtle-Files für Clustering Algorithmen4</a:t>
+            </a:r>
+          </a:p>
+          <a:p>
+            <a:pPr marL="0" indent="0"/>
+            <a:endParaRPr lang="de-DE" sz="2000" dirty="0" smtClean="0"/>
+          </a:p>
+          <a:p>
+            <a:pPr marL="0" indent="0"/>
+            <a:r>
+              <a:rPr lang="de-DE" sz="2000" dirty="0" smtClean="0"/>
+              <a:t>Bewältigung verschiedener Aufgaben</a:t>
+            </a:r>
+          </a:p>
+          <a:p>
+            <a:pPr marL="285750" indent="-285750">
+              <a:buFont typeface="Arial" panose="020B0604020202020204" pitchFamily="34" charset="0"/>
+              <a:buChar char="•"/>
+            </a:pPr>
+            <a:r>
+              <a:rPr lang="de-DE" sz="2000" dirty="0" smtClean="0"/>
+              <a:t>A: Ausgabe von Clusteringalgorithmen zu einer Datenmenge mit bestimmten Eigenschaften (Szenario)</a:t>
+            </a:r>
+          </a:p>
+          <a:p>
+            <a:pPr marL="285750" indent="-285750">
+              <a:buFont typeface="Arial" panose="020B0604020202020204" pitchFamily="34" charset="0"/>
+              <a:buChar char="•"/>
+            </a:pPr>
+            <a:r>
+              <a:rPr lang="de-DE" sz="2000" dirty="0" smtClean="0"/>
+              <a:t>B: Ausgabe von Clusteringalgorithmen zu einer bestimmten Kategorie </a:t>
+            </a:r>
+          </a:p>
+          <a:p>
+            <a:pPr marL="285750" indent="-285750">
+              <a:buFont typeface="Arial" panose="020B0604020202020204" pitchFamily="34" charset="0"/>
+              <a:buChar char="•"/>
+            </a:pPr>
+            <a:r>
+              <a:rPr lang="de-DE" sz="2000" dirty="0" smtClean="0"/>
+              <a:t>C: Ausgabe von Clusteringalgorithmen zu bestimmten Eigenschaften</a:t>
+            </a:r>
+          </a:p>
+          <a:p>
+            <a:pPr marL="285750" indent="-285750">
+              <a:buFont typeface="Arial" panose="020B0604020202020204" pitchFamily="34" charset="0"/>
+              <a:buChar char="•"/>
+            </a:pPr>
+            <a:r>
+              <a:rPr lang="de-DE" sz="2000" dirty="0" smtClean="0"/>
+              <a:t>D: Ausgabe von </a:t>
+            </a:r>
+            <a:r>
+              <a:rPr lang="de-DE" sz="2000" dirty="0" err="1" smtClean="0"/>
+              <a:t>Papern</a:t>
+            </a:r>
+            <a:r>
+              <a:rPr lang="de-DE" sz="2000" dirty="0" smtClean="0"/>
+              <a:t> zu ausgewählten Clusteringalgorithmen</a:t>
+            </a:r>
+            <a:endParaRPr lang="de-DE" sz="2000" dirty="0" smtClean="0"/>
+          </a:p>
+          <a:p>
+            <a:pPr marL="342900" indent="-342900">
+              <a:buFont typeface="Arial" panose="020B0604020202020204" pitchFamily="34" charset="0"/>
+              <a:buChar char="•"/>
+            </a:pPr>
+            <a:endParaRPr lang="de-DE" sz="1800" dirty="0" smtClean="0"/>
+          </a:p>
+          <a:p>
+            <a:pPr marL="342900" indent="-342900">
+              <a:buFont typeface="Arial" panose="020B0604020202020204" pitchFamily="34" charset="0"/>
+              <a:buChar char="•"/>
+            </a:pPr>
+            <a:endParaRPr lang="de-DE" sz="1800" dirty="0"/>
+          </a:p>
+        </p:txBody>
+      </p:sp>
+    </p:spTree>
+    <p:extLst>
+      <p:ext uri="{BB962C8B-B14F-4D97-AF65-F5344CB8AC3E}">
+        <p14:creationId xmlns:p14="http://schemas.microsoft.com/office/powerpoint/2010/main" val="1997994863"/>
+      </p:ext>
+    </p:extLst>
+  </p:cSld>
+  <p:clrMapOvr>
+    <a:masterClrMapping/>
+  </p:clrMapOvr>
+  <p:transition spd="med"/>
+  <p:timing>
+    <p:tnLst>
+      <p:par>
+        <p:cTn id="1" dur="indefinite" restart="never" nodeType="tmRoot"/>
+      </p:par>
+    </p:tnLst>
+  </p:timing>
+</p:sld>
+</file>
+
+<file path=ppt/slides/slide4.xml><?xml version="1.0" encoding="utf-8"?>
+<p:sld xmlns:a="http://schemas.openxmlformats.org/drawingml/2006/main" xmlns:r="http://schemas.openxmlformats.org/officeDocument/2006/relationships" xmlns:p="http://schemas.openxmlformats.org/presentationml/2006/main">
+  <p:cSld>
+    <p:spTree>
+      <p:nvGrpSpPr>
+        <p:cNvPr id="1" name=""/>
+        <p:cNvGrpSpPr/>
+        <p:nvPr/>
+      </p:nvGrpSpPr>
+      <p:grpSpPr>
+        <a:xfrm>
+          <a:off x="0" y="0"/>
+          <a:ext cx="0" cy="0"/>
+          <a:chOff x="0" y="0"/>
+          <a:chExt cx="0" cy="0"/>
+        </a:xfrm>
+      </p:grpSpPr>
+      <p:sp>
+        <p:nvSpPr>
+          <p:cNvPr id="2" name="Titel 1"/>
+          <p:cNvSpPr>
+            <a:spLocks noGrp="1"/>
+          </p:cNvSpPr>
+          <p:nvPr>
+            <p:ph type="title"/>
+          </p:nvPr>
+        </p:nvSpPr>
+        <p:spPr/>
+        <p:txBody>
+          <a:bodyPr/>
+          <a:lstStyle/>
+          <a:p>
+            <a:r>
+              <a:rPr lang="de-DE" dirty="0" smtClean="0"/>
+              <a:t>Aufgabenverteilung / Workflow</a:t>
+            </a:r>
+            <a:endParaRPr lang="de-DE" dirty="0"/>
+          </a:p>
+        </p:txBody>
+      </p:sp>
+      <p:sp>
+        <p:nvSpPr>
+          <p:cNvPr id="3" name="Textplatzhalter 2"/>
+          <p:cNvSpPr>
+            <a:spLocks noGrp="1"/>
+          </p:cNvSpPr>
+          <p:nvPr>
+            <p:ph type="body" idx="1"/>
+          </p:nvPr>
+        </p:nvSpPr>
+        <p:spPr>
+          <a:xfrm>
+            <a:off x="533400" y="1408113"/>
+            <a:ext cx="8153400" cy="5045224"/>
+          </a:xfrm>
+        </p:spPr>
+        <p:txBody>
+          <a:bodyPr/>
+          <a:lstStyle/>
           <a:p>
             <a:pPr marL="457200" indent="-457200">
               <a:buFont typeface="+mj-lt"/>
@@ -4731,7 +5164,7 @@
             </a:pPr>
             <a:r>
               <a:rPr lang="de-DE" sz="2400" dirty="0" smtClean="0"/>
-              <a:t>Datensammlung Clustering (Stephan)</a:t>
+              <a:t>Architektur &amp; Implementierung Java-Programm (Lars)</a:t>
             </a:r>
           </a:p>
           <a:p>
@@ -4741,7 +5174,7 @@
             </a:pPr>
             <a:r>
               <a:rPr lang="de-DE" sz="2400" dirty="0" smtClean="0"/>
-              <a:t>Clustering-Turtle-File (Stephan)</a:t>
+              <a:t>Datensammlung Clustering (Stephan)</a:t>
             </a:r>
           </a:p>
           <a:p>
@@ -4751,7 +5184,7 @@
             </a:pPr>
             <a:r>
               <a:rPr lang="de-DE" sz="2400" dirty="0" smtClean="0"/>
-              <a:t>Erstellung erster Anfragen (Andy)</a:t>
+              <a:t>Clustering-Turtle-File (Stephan)</a:t>
             </a:r>
           </a:p>
           <a:p>
@@ -4761,7 +5194,7 @@
             </a:pPr>
             <a:r>
               <a:rPr lang="de-DE" sz="2400" dirty="0" smtClean="0"/>
-              <a:t>Optimierung Turtle-File (Andy &amp; Lars)</a:t>
+              <a:t>Erstellung erster Anfragen (Andy)</a:t>
             </a:r>
           </a:p>
           <a:p>
@@ -4771,11 +5204,7 @@
             </a:pPr>
             <a:r>
               <a:rPr lang="de-DE" sz="2400" dirty="0" smtClean="0"/>
-              <a:t>Optimierung Anfragen &amp; Hilfsanfragen (Lars</a:t>
-            </a:r>
-            <a:r>
-              <a:rPr lang="de-DE" sz="2400" dirty="0" smtClean="0"/>
-              <a:t>)</a:t>
+              <a:t>Optimierung Turtle-File (Andy &amp; Lars)</a:t>
             </a:r>
           </a:p>
           <a:p>
@@ -4785,9 +5214,18 @@
             </a:pPr>
             <a:r>
               <a:rPr lang="de-DE" sz="2400" dirty="0" smtClean="0"/>
+              <a:t>Optimierung Anfragen &amp; Hilfsanfragen (Lars)</a:t>
+            </a:r>
+          </a:p>
+          <a:p>
+            <a:pPr marL="457200" indent="-457200">
+              <a:buFont typeface="+mj-lt"/>
+              <a:buAutoNum type="arabicPeriod"/>
+            </a:pPr>
+            <a:r>
+              <a:rPr lang="de-DE" sz="2400" dirty="0" smtClean="0"/>
               <a:t>Tests (Andy, Stephan, Lars)</a:t>
             </a:r>
-            <a:endParaRPr lang="de-DE" sz="2400" dirty="0" smtClean="0"/>
           </a:p>
           <a:p>
             <a:pPr marL="342900" indent="-342900">
@@ -4819,7 +5257,7 @@
 </p:sld>
 </file>
 
-<file path=ppt/slides/slide4.xml><?xml version="1.0" encoding="utf-8"?>
+<file path=ppt/slides/slide5.xml><?xml version="1.0" encoding="utf-8"?>
 <p:sld xmlns:a="http://schemas.openxmlformats.org/drawingml/2006/main" xmlns:r="http://schemas.openxmlformats.org/officeDocument/2006/relationships" xmlns:p="http://schemas.openxmlformats.org/presentationml/2006/main">
   <p:cSld>
     <p:spTree>
@@ -5375,7 +5813,7 @@
 </p:sld>
 </file>
 
-<file path=ppt/slides/slide5.xml><?xml version="1.0" encoding="utf-8"?>
+<file path=ppt/slides/slide6.xml><?xml version="1.0" encoding="utf-8"?>
 <p:sld xmlns:a="http://schemas.openxmlformats.org/drawingml/2006/main" xmlns:r="http://schemas.openxmlformats.org/officeDocument/2006/relationships" xmlns:p="http://schemas.openxmlformats.org/presentationml/2006/main">
   <p:cSld>
     <p:spTree>
@@ -5477,7 +5915,7 @@
 </p:sld>
 </file>
 
-<file path=ppt/slides/slide6.xml><?xml version="1.0" encoding="utf-8"?>
+<file path=ppt/slides/slide7.xml><?xml version="1.0" encoding="utf-8"?>
 <p:sld xmlns:a="http://schemas.openxmlformats.org/drawingml/2006/main" xmlns:r="http://schemas.openxmlformats.org/officeDocument/2006/relationships" xmlns:p="http://schemas.openxmlformats.org/presentationml/2006/main">
   <p:cSld>
     <p:spTree>
@@ -5579,7 +6017,7 @@
 </p:sld>
 </file>
 
-<file path=ppt/slides/slide7.xml><?xml version="1.0" encoding="utf-8"?>
+<file path=ppt/slides/slide8.xml><?xml version="1.0" encoding="utf-8"?>
 <p:sld xmlns:a="http://schemas.openxmlformats.org/drawingml/2006/main" xmlns:r="http://schemas.openxmlformats.org/officeDocument/2006/relationships" xmlns:p="http://schemas.openxmlformats.org/presentationml/2006/main">
   <p:cSld>
     <p:spTree>
@@ -5681,7 +6119,7 @@
 </p:sld>
 </file>
 
-<file path=ppt/slides/slide8.xml><?xml version="1.0" encoding="utf-8"?>
+<file path=ppt/slides/slide9.xml><?xml version="1.0" encoding="utf-8"?>
 <p:sld xmlns:a="http://schemas.openxmlformats.org/drawingml/2006/main" xmlns:r="http://schemas.openxmlformats.org/officeDocument/2006/relationships" xmlns:p="http://schemas.openxmlformats.org/presentationml/2006/main">
   <p:cSld>
     <p:spTree>
@@ -5766,189 +6204,6 @@
     <p:extLst>
       <p:ext uri="{BB962C8B-B14F-4D97-AF65-F5344CB8AC3E}">
         <p14:creationId xmlns:p14="http://schemas.microsoft.com/office/powerpoint/2010/main" val="2075556246"/>
-      </p:ext>
-    </p:extLst>
-  </p:cSld>
-  <p:clrMapOvr>
-    <a:masterClrMapping/>
-  </p:clrMapOvr>
-  <p:transition spd="med"/>
-  <p:timing>
-    <p:tnLst>
-      <p:par>
-        <p:cTn id="1" dur="indefinite" restart="never" nodeType="tmRoot"/>
-      </p:par>
-    </p:tnLst>
-  </p:timing>
-</p:sld>
-</file>
-
-<file path=ppt/slides/slide9.xml><?xml version="1.0" encoding="utf-8"?>
-<p:sld xmlns:a="http://schemas.openxmlformats.org/drawingml/2006/main" xmlns:r="http://schemas.openxmlformats.org/officeDocument/2006/relationships" xmlns:p="http://schemas.openxmlformats.org/presentationml/2006/main">
-  <p:cSld>
-    <p:spTree>
-      <p:nvGrpSpPr>
-        <p:cNvPr id="1" name=""/>
-        <p:cNvGrpSpPr/>
-        <p:nvPr/>
-      </p:nvGrpSpPr>
-      <p:grpSpPr>
-        <a:xfrm>
-          <a:off x="0" y="0"/>
-          <a:ext cx="0" cy="0"/>
-          <a:chOff x="0" y="0"/>
-          <a:chExt cx="0" cy="0"/>
-        </a:xfrm>
-      </p:grpSpPr>
-      <p:sp>
-        <p:nvSpPr>
-          <p:cNvPr id="2" name="Titel 1"/>
-          <p:cNvSpPr>
-            <a:spLocks noGrp="1"/>
-          </p:cNvSpPr>
-          <p:nvPr>
-            <p:ph type="title"/>
-          </p:nvPr>
-        </p:nvSpPr>
-        <p:spPr/>
-        <p:txBody>
-          <a:bodyPr/>
-          <a:lstStyle/>
-          <a:p>
-            <a:r>
-              <a:rPr lang="de-DE" dirty="0" smtClean="0"/>
-              <a:t>Funktionalitäten</a:t>
-            </a:r>
-            <a:endParaRPr lang="de-DE" dirty="0"/>
-          </a:p>
-        </p:txBody>
-      </p:sp>
-      <p:sp>
-        <p:nvSpPr>
-          <p:cNvPr id="3" name="Textplatzhalter 2"/>
-          <p:cNvSpPr>
-            <a:spLocks noGrp="1"/>
-          </p:cNvSpPr>
-          <p:nvPr>
-            <p:ph type="body" idx="1"/>
-          </p:nvPr>
-        </p:nvSpPr>
-        <p:spPr>
-          <a:xfrm>
-            <a:off x="539552" y="1268761"/>
-            <a:ext cx="8153400" cy="4968552"/>
-          </a:xfrm>
-        </p:spPr>
-        <p:txBody>
-          <a:bodyPr/>
-          <a:lstStyle/>
-          <a:p>
-            <a:pPr marL="342900" indent="-342900">
-              <a:buFont typeface="Arial" panose="020B0604020202020204" pitchFamily="34" charset="0"/>
-              <a:buChar char="•"/>
-            </a:pPr>
-            <a:r>
-              <a:rPr lang="de-DE" dirty="0" smtClean="0"/>
-              <a:t>Modell ausgeben (Turtle, XML, N-Triple, N3, JSON, RDF JSON)</a:t>
-            </a:r>
-          </a:p>
-          <a:p>
-            <a:pPr marL="342900" indent="-342900">
-              <a:buFont typeface="Arial" panose="020B0604020202020204" pitchFamily="34" charset="0"/>
-              <a:buChar char="•"/>
-            </a:pPr>
-            <a:r>
-              <a:rPr lang="de-DE" dirty="0" smtClean="0"/>
-              <a:t>Grundlegende Ausgaben:</a:t>
-            </a:r>
-          </a:p>
-          <a:p>
-            <a:pPr marL="820897" lvl="1" indent="-342900">
-              <a:buFont typeface="Arial" panose="020B0604020202020204" pitchFamily="34" charset="0"/>
-              <a:buChar char="•"/>
-            </a:pPr>
-            <a:r>
-              <a:rPr lang="de-DE" dirty="0" smtClean="0"/>
-              <a:t>Kategorien, Algorithmen, Eigenschaften, Clustertypen</a:t>
-            </a:r>
-          </a:p>
-          <a:p>
-            <a:pPr marL="342900" indent="-342900">
-              <a:buFont typeface="Arial" panose="020B0604020202020204" pitchFamily="34" charset="0"/>
-              <a:buChar char="•"/>
-            </a:pPr>
-            <a:r>
-              <a:rPr lang="de-DE" dirty="0" smtClean="0"/>
-              <a:t>A: Scenario: Auswahl von einem oder mehreren Clustertypen -&gt; Ausgabe aller passenden Algorithmen</a:t>
-            </a:r>
-          </a:p>
-          <a:p>
-            <a:pPr marL="342900" indent="-342900">
-              <a:buFont typeface="Arial" panose="020B0604020202020204" pitchFamily="34" charset="0"/>
-              <a:buChar char="•"/>
-            </a:pPr>
-            <a:r>
-              <a:rPr lang="de-DE" dirty="0" smtClean="0"/>
-              <a:t>B: </a:t>
-            </a:r>
-            <a:r>
-              <a:rPr lang="de-DE" dirty="0" err="1" smtClean="0"/>
-              <a:t>Browsing</a:t>
-            </a:r>
-            <a:r>
-              <a:rPr lang="de-DE" dirty="0" smtClean="0"/>
-              <a:t>: Auswahl einer Kategorie</a:t>
-            </a:r>
-            <a:br>
-              <a:rPr lang="de-DE" dirty="0" smtClean="0"/>
-            </a:br>
-            <a:r>
-              <a:rPr lang="de-DE" dirty="0" smtClean="0"/>
-              <a:t>-&gt; Ausgabe aller passenden Algorithmen</a:t>
-            </a:r>
-          </a:p>
-          <a:p>
-            <a:pPr marL="342900" indent="-342900">
-              <a:buFont typeface="Arial" panose="020B0604020202020204" pitchFamily="34" charset="0"/>
-              <a:buChar char="•"/>
-            </a:pPr>
-            <a:r>
-              <a:rPr lang="de-DE" dirty="0" smtClean="0"/>
-              <a:t>C: Eigenschaften: Auswahl mehrerer Eigenschaften und deren Werte</a:t>
-            </a:r>
-          </a:p>
-          <a:p>
-            <a:pPr marL="477997" lvl="1" indent="0">
-              <a:buNone/>
-            </a:pPr>
-            <a:r>
-              <a:rPr lang="de-DE" dirty="0" smtClean="0"/>
-              <a:t>-&gt; Ausgabe aller passenden Algorithmen</a:t>
-            </a:r>
-          </a:p>
-          <a:p>
-            <a:pPr marL="342900" indent="-342900">
-              <a:buFont typeface="Arial" panose="020B0604020202020204" pitchFamily="34" charset="0"/>
-              <a:buChar char="•"/>
-            </a:pPr>
-            <a:r>
-              <a:rPr lang="de-DE" dirty="0" smtClean="0"/>
-              <a:t>D: Literatur: Auswahl von einem oder mehreren Algorithmen</a:t>
-            </a:r>
-            <a:br>
-              <a:rPr lang="de-DE" dirty="0" smtClean="0"/>
-            </a:br>
-            <a:r>
-              <a:rPr lang="de-DE" dirty="0" smtClean="0"/>
-              <a:t>-&gt; Ausgabe aller zugehörigen Paper</a:t>
-            </a:r>
-          </a:p>
-        </p:txBody>
-      </p:sp>
-    </p:spTree>
-    <p:extLst>
-      <p:ext uri="{BB962C8B-B14F-4D97-AF65-F5344CB8AC3E}">
-        <p14:creationId xmlns:p14="http://schemas.microsoft.com/office/powerpoint/2010/main" val="2063078888"/>
       </p:ext>
     </p:extLst>
   </p:cSld>

</xml_diff>